<commit_message>
adding commandline option lesson
</commit_message>
<xml_diff>
--- a/slide_decks/commandlne_arguments_python.pptx
+++ b/slide_decks/commandlne_arguments_python.pptx
@@ -26,7 +26,6 @@
     <p:sldId id="274" r:id="rId20"/>
     <p:sldId id="275" r:id="rId21"/>
     <p:sldId id="276" r:id="rId22"/>
-    <p:sldId id="277" r:id="rId23"/>
   </p:sldIdLst>
   <p:sldSz cx="9144000" cy="6858000" type="screen4x3"/>
   <p:notesSz cx="6858000" cy="9144000"/>
@@ -310,7 +309,7 @@
             <a:fld id="{AFED4DF7-13C3-4505-8044-4B619B62AE5F}" type="datetimeFigureOut">
               <a:rPr lang="en-US" smtClean="0"/>
               <a:pPr/>
-              <a:t>5/5/2020</a:t>
+              <a:t>5/7/2020</a:t>
             </a:fld>
             <a:endParaRPr lang="en-US"/>
           </a:p>
@@ -477,7 +476,7 @@
             <a:fld id="{AFED4DF7-13C3-4505-8044-4B619B62AE5F}" type="datetimeFigureOut">
               <a:rPr lang="en-US" smtClean="0"/>
               <a:pPr/>
-              <a:t>5/5/2020</a:t>
+              <a:t>5/7/2020</a:t>
             </a:fld>
             <a:endParaRPr lang="en-US"/>
           </a:p>
@@ -654,7 +653,7 @@
             <a:fld id="{AFED4DF7-13C3-4505-8044-4B619B62AE5F}" type="datetimeFigureOut">
               <a:rPr lang="en-US" smtClean="0"/>
               <a:pPr/>
-              <a:t>5/5/2020</a:t>
+              <a:t>5/7/2020</a:t>
             </a:fld>
             <a:endParaRPr lang="en-US"/>
           </a:p>
@@ -821,7 +820,7 @@
             <a:fld id="{AFED4DF7-13C3-4505-8044-4B619B62AE5F}" type="datetimeFigureOut">
               <a:rPr lang="en-US" smtClean="0"/>
               <a:pPr/>
-              <a:t>5/5/2020</a:t>
+              <a:t>5/7/2020</a:t>
             </a:fld>
             <a:endParaRPr lang="en-US"/>
           </a:p>
@@ -1064,7 +1063,7 @@
             <a:fld id="{AFED4DF7-13C3-4505-8044-4B619B62AE5F}" type="datetimeFigureOut">
               <a:rPr lang="en-US" smtClean="0"/>
               <a:pPr/>
-              <a:t>5/5/2020</a:t>
+              <a:t>5/7/2020</a:t>
             </a:fld>
             <a:endParaRPr lang="en-US"/>
           </a:p>
@@ -1349,7 +1348,7 @@
             <a:fld id="{AFED4DF7-13C3-4505-8044-4B619B62AE5F}" type="datetimeFigureOut">
               <a:rPr lang="en-US" smtClean="0"/>
               <a:pPr/>
-              <a:t>5/5/2020</a:t>
+              <a:t>5/7/2020</a:t>
             </a:fld>
             <a:endParaRPr lang="en-US"/>
           </a:p>
@@ -1768,7 +1767,7 @@
             <a:fld id="{AFED4DF7-13C3-4505-8044-4B619B62AE5F}" type="datetimeFigureOut">
               <a:rPr lang="en-US" smtClean="0"/>
               <a:pPr/>
-              <a:t>5/5/2020</a:t>
+              <a:t>5/7/2020</a:t>
             </a:fld>
             <a:endParaRPr lang="en-US"/>
           </a:p>
@@ -1883,7 +1882,7 @@
             <a:fld id="{AFED4DF7-13C3-4505-8044-4B619B62AE5F}" type="datetimeFigureOut">
               <a:rPr lang="en-US" smtClean="0"/>
               <a:pPr/>
-              <a:t>5/5/2020</a:t>
+              <a:t>5/7/2020</a:t>
             </a:fld>
             <a:endParaRPr lang="en-US"/>
           </a:p>
@@ -1975,7 +1974,7 @@
             <a:fld id="{AFED4DF7-13C3-4505-8044-4B619B62AE5F}" type="datetimeFigureOut">
               <a:rPr lang="en-US" smtClean="0"/>
               <a:pPr/>
-              <a:t>5/5/2020</a:t>
+              <a:t>5/7/2020</a:t>
             </a:fld>
             <a:endParaRPr lang="en-US"/>
           </a:p>
@@ -2249,7 +2248,7 @@
             <a:fld id="{AFED4DF7-13C3-4505-8044-4B619B62AE5F}" type="datetimeFigureOut">
               <a:rPr lang="en-US" smtClean="0"/>
               <a:pPr/>
-              <a:t>5/5/2020</a:t>
+              <a:t>5/7/2020</a:t>
             </a:fld>
             <a:endParaRPr lang="en-US"/>
           </a:p>
@@ -2499,7 +2498,7 @@
             <a:fld id="{AFED4DF7-13C3-4505-8044-4B619B62AE5F}" type="datetimeFigureOut">
               <a:rPr lang="en-US" smtClean="0"/>
               <a:pPr/>
-              <a:t>5/5/2020</a:t>
+              <a:t>5/7/2020</a:t>
             </a:fld>
             <a:endParaRPr lang="en-US"/>
           </a:p>
@@ -2709,7 +2708,7 @@
             <a:fld id="{AFED4DF7-13C3-4505-8044-4B619B62AE5F}" type="datetimeFigureOut">
               <a:rPr lang="en-US" smtClean="0"/>
               <a:pPr/>
-              <a:t>5/5/2020</a:t>
+              <a:t>5/7/2020</a:t>
             </a:fld>
             <a:endParaRPr lang="en-US"/>
           </a:p>
@@ -3321,11 +3320,7 @@
           <a:p>
             <a:r>
               <a:rPr lang="en-US" dirty="0" smtClean="0"/>
-              <a:t>Can be </a:t>
-            </a:r>
-            <a:r>
-              <a:rPr lang="en-US" dirty="0" smtClean="0"/>
-              <a:t>modified</a:t>
+              <a:t>Can be modified</a:t>
             </a:r>
           </a:p>
           <a:p>
@@ -3414,11 +3409,7 @@
           <a:p>
             <a:r>
               <a:rPr lang="en-US" dirty="0" smtClean="0"/>
-              <a:t>The default </a:t>
-            </a:r>
-            <a:r>
-              <a:rPr lang="en-US" dirty="0" smtClean="0"/>
-              <a:t>type of the arguments read is a string. How do you convert the argument into an integer?</a:t>
+              <a:t>The default type of the arguments read is a string. How do you convert the argument into an integer?</a:t>
             </a:r>
           </a:p>
           <a:p>
@@ -3538,35 +3529,14 @@
               <a:rPr lang="en-US" dirty="0" smtClean="0">
                 <a:latin typeface="Consolas" pitchFamily="49" charset="0"/>
               </a:rPr>
-              <a:t>[1</a:t>
-            </a:r>
-            <a:r>
-              <a:rPr lang="en-US" dirty="0" smtClean="0">
-                <a:latin typeface="Consolas" pitchFamily="49" charset="0"/>
-              </a:rPr>
-              <a:t>:]: </a:t>
+              <a:t>[1:]: </a:t>
             </a:r>
             <a:r>
               <a:rPr lang="en-US" sz="2100" dirty="0" smtClean="0">
                 <a:latin typeface="Consolas" pitchFamily="49" charset="0"/>
               </a:rPr>
-              <a:t># </a:t>
-            </a:r>
-            <a:r>
-              <a:rPr lang="en-US" sz="2100" dirty="0" smtClean="0">
-                <a:latin typeface="Consolas" pitchFamily="49" charset="0"/>
-              </a:rPr>
-              <a:t>reads all the </a:t>
-            </a:r>
-            <a:r>
-              <a:rPr lang="en-US" sz="2100" dirty="0" smtClean="0">
-                <a:latin typeface="Consolas" pitchFamily="49" charset="0"/>
-              </a:rPr>
-              <a:t>integers</a:t>
-            </a:r>
-            <a:endParaRPr lang="en-US" sz="2100" dirty="0" smtClean="0">
-              <a:latin typeface="Consolas" pitchFamily="49" charset="0"/>
-            </a:endParaRPr>
+              <a:t># reads all the integers</a:t>
+            </a:r>
           </a:p>
           <a:p>
             <a:pPr>
@@ -3723,7 +3693,11 @@
           <a:bodyPr/>
           <a:lstStyle/>
           <a:p>
-            <a:endParaRPr lang="en-US"/>
+            <a:r>
+              <a:rPr lang="en-US" dirty="0" smtClean="0"/>
+              <a:t>How to process integers?</a:t>
+            </a:r>
+            <a:endParaRPr lang="en-US" dirty="0"/>
           </a:p>
         </p:txBody>
       </p:sp>
@@ -3742,7 +3716,17 @@
           <a:bodyPr/>
           <a:lstStyle/>
           <a:p>
-            <a:endParaRPr lang="en-US"/>
+            <a:r>
+              <a:rPr lang="en-US" dirty="0" smtClean="0"/>
+              <a:t>Let’s read in an arbitrary number of arguments via the command line</a:t>
+            </a:r>
+          </a:p>
+          <a:p>
+            <a:r>
+              <a:rPr lang="en-US" dirty="0" smtClean="0"/>
+              <a:t>Let’s go ahead and write the appropriate code to sum all of the integers, and to multiply all of the integers </a:t>
+            </a:r>
+            <a:endParaRPr lang="en-US" dirty="0"/>
           </a:p>
         </p:txBody>
       </p:sp>
@@ -3786,7 +3770,11 @@
           <a:bodyPr/>
           <a:lstStyle/>
           <a:p>
-            <a:endParaRPr lang="en-US"/>
+            <a:r>
+              <a:rPr lang="en-US" dirty="0" smtClean="0"/>
+              <a:t>Break it down bit-by-bit</a:t>
+            </a:r>
+            <a:endParaRPr lang="en-US" dirty="0"/>
           </a:p>
         </p:txBody>
       </p:sp>
@@ -3805,7 +3793,37 @@
           <a:bodyPr/>
           <a:lstStyle/>
           <a:p>
-            <a:endParaRPr lang="en-US"/>
+            <a:r>
+              <a:rPr lang="en-US" dirty="0" smtClean="0"/>
+              <a:t>What variables would you need? What data structure would you choose?</a:t>
+            </a:r>
+          </a:p>
+          <a:p>
+            <a:r>
+              <a:rPr lang="en-US" dirty="0" smtClean="0"/>
+              <a:t>How to read in a arbitrary number of integers via command line?</a:t>
+            </a:r>
+          </a:p>
+          <a:p>
+            <a:r>
+              <a:rPr lang="en-US" dirty="0" smtClean="0"/>
+              <a:t>How would you sum all of those numbers together? Would a loop help?</a:t>
+            </a:r>
+          </a:p>
+          <a:p>
+            <a:r>
+              <a:rPr lang="en-US" dirty="0" smtClean="0"/>
+              <a:t>How would you multiply all of thos</a:t>
+            </a:r>
+            <a:r>
+              <a:rPr lang="en-US" dirty="0" smtClean="0"/>
+              <a:t>e </a:t>
+            </a:r>
+            <a:r>
+              <a:rPr lang="en-US" dirty="0" smtClean="0"/>
+              <a:t>numbers together?</a:t>
+            </a:r>
+            <a:endParaRPr lang="en-US" dirty="0"/>
           </a:p>
         </p:txBody>
       </p:sp>
@@ -3849,7 +3867,11 @@
           <a:bodyPr/>
           <a:lstStyle/>
           <a:p>
-            <a:endParaRPr lang="en-US"/>
+            <a:r>
+              <a:rPr lang="en-US" dirty="0" smtClean="0"/>
+              <a:t>A Solution</a:t>
+            </a:r>
+            <a:endParaRPr lang="en-US" dirty="0"/>
           </a:p>
         </p:txBody>
       </p:sp>
@@ -3863,12 +3885,446 @@
             <p:ph idx="1"/>
           </p:nvPr>
         </p:nvSpPr>
-        <p:spPr/>
-        <p:txBody>
-          <a:bodyPr/>
-          <a:lstStyle/>
-          <a:p>
-            <a:endParaRPr lang="en-US"/>
+        <p:spPr>
+          <a:xfrm>
+            <a:off x="304800" y="1295400"/>
+            <a:ext cx="8458200" cy="5105400"/>
+          </a:xfrm>
+        </p:spPr>
+        <p:txBody>
+          <a:bodyPr>
+            <a:normAutofit fontScale="70000" lnSpcReduction="20000"/>
+          </a:bodyPr>
+          <a:lstStyle/>
+          <a:p>
+            <a:pPr>
+              <a:buNone/>
+            </a:pPr>
+            <a:r>
+              <a:rPr lang="en-US" b="1" dirty="0" smtClean="0">
+                <a:latin typeface="Consolas" pitchFamily="49" charset="0"/>
+              </a:rPr>
+              <a:t>import </a:t>
+            </a:r>
+            <a:r>
+              <a:rPr lang="en-US" dirty="0" smtClean="0">
+                <a:latin typeface="Consolas" pitchFamily="49" charset="0"/>
+              </a:rPr>
+              <a:t>sys</a:t>
+            </a:r>
+            <a:br>
+              <a:rPr lang="en-US" dirty="0" smtClean="0">
+                <a:latin typeface="Consolas" pitchFamily="49" charset="0"/>
+              </a:rPr>
+            </a:br>
+            <a:r>
+              <a:rPr lang="en-US" dirty="0" smtClean="0">
+                <a:latin typeface="Consolas" pitchFamily="49" charset="0"/>
+              </a:rPr>
+              <a:t/>
+            </a:r>
+            <a:br>
+              <a:rPr lang="en-US" dirty="0" smtClean="0">
+                <a:latin typeface="Consolas" pitchFamily="49" charset="0"/>
+              </a:rPr>
+            </a:br>
+            <a:r>
+              <a:rPr lang="en-US" dirty="0" err="1" smtClean="0">
+                <a:latin typeface="Consolas" pitchFamily="49" charset="0"/>
+              </a:rPr>
+              <a:t>list_of_ints</a:t>
+            </a:r>
+            <a:r>
+              <a:rPr lang="en-US" dirty="0" smtClean="0">
+                <a:latin typeface="Consolas" pitchFamily="49" charset="0"/>
+              </a:rPr>
+              <a:t>, sum, square = [], 0, 1</a:t>
+            </a:r>
+            <a:br>
+              <a:rPr lang="en-US" dirty="0" smtClean="0">
+                <a:latin typeface="Consolas" pitchFamily="49" charset="0"/>
+              </a:rPr>
+            </a:br>
+            <a:r>
+              <a:rPr lang="en-US" b="1" dirty="0" smtClean="0">
+                <a:latin typeface="Consolas" pitchFamily="49" charset="0"/>
+              </a:rPr>
+              <a:t>for </a:t>
+            </a:r>
+            <a:r>
+              <a:rPr lang="en-US" dirty="0" smtClean="0">
+                <a:latin typeface="Consolas" pitchFamily="49" charset="0"/>
+              </a:rPr>
+              <a:t>x </a:t>
+            </a:r>
+            <a:r>
+              <a:rPr lang="en-US" b="1" dirty="0" smtClean="0">
+                <a:latin typeface="Consolas" pitchFamily="49" charset="0"/>
+              </a:rPr>
+              <a:t>in </a:t>
+            </a:r>
+            <a:r>
+              <a:rPr lang="en-US" dirty="0" err="1" smtClean="0">
+                <a:latin typeface="Consolas" pitchFamily="49" charset="0"/>
+              </a:rPr>
+              <a:t>sys.argv</a:t>
+            </a:r>
+            <a:r>
+              <a:rPr lang="en-US" dirty="0" smtClean="0">
+                <a:latin typeface="Consolas" pitchFamily="49" charset="0"/>
+              </a:rPr>
+              <a:t>[1:]:</a:t>
+            </a:r>
+            <a:br>
+              <a:rPr lang="en-US" dirty="0" smtClean="0">
+                <a:latin typeface="Consolas" pitchFamily="49" charset="0"/>
+              </a:rPr>
+            </a:br>
+            <a:r>
+              <a:rPr lang="en-US" dirty="0" smtClean="0">
+                <a:latin typeface="Consolas" pitchFamily="49" charset="0"/>
+              </a:rPr>
+              <a:t>    </a:t>
+            </a:r>
+            <a:r>
+              <a:rPr lang="en-US" dirty="0" err="1" smtClean="0">
+                <a:latin typeface="Consolas" pitchFamily="49" charset="0"/>
+              </a:rPr>
+              <a:t>read_ints</a:t>
+            </a:r>
+            <a:r>
+              <a:rPr lang="en-US" dirty="0" smtClean="0">
+                <a:latin typeface="Consolas" pitchFamily="49" charset="0"/>
+              </a:rPr>
+              <a:t> = </a:t>
+            </a:r>
+            <a:r>
+              <a:rPr lang="en-US" dirty="0" err="1" smtClean="0">
+                <a:latin typeface="Consolas" pitchFamily="49" charset="0"/>
+              </a:rPr>
+              <a:t>int</a:t>
+            </a:r>
+            <a:r>
+              <a:rPr lang="en-US" dirty="0" smtClean="0">
+                <a:latin typeface="Consolas" pitchFamily="49" charset="0"/>
+              </a:rPr>
+              <a:t>(x)</a:t>
+            </a:r>
+            <a:br>
+              <a:rPr lang="en-US" dirty="0" smtClean="0">
+                <a:latin typeface="Consolas" pitchFamily="49" charset="0"/>
+              </a:rPr>
+            </a:br>
+            <a:r>
+              <a:rPr lang="en-US" dirty="0" smtClean="0">
+                <a:latin typeface="Consolas" pitchFamily="49" charset="0"/>
+              </a:rPr>
+              <a:t>    </a:t>
+            </a:r>
+            <a:r>
+              <a:rPr lang="en-US" dirty="0" err="1" smtClean="0">
+                <a:latin typeface="Consolas" pitchFamily="49" charset="0"/>
+              </a:rPr>
+              <a:t>list_of_ints.append</a:t>
+            </a:r>
+            <a:r>
+              <a:rPr lang="en-US" dirty="0" smtClean="0">
+                <a:latin typeface="Consolas" pitchFamily="49" charset="0"/>
+              </a:rPr>
+              <a:t>(</a:t>
+            </a:r>
+            <a:r>
+              <a:rPr lang="en-US" dirty="0" err="1" smtClean="0">
+                <a:latin typeface="Consolas" pitchFamily="49" charset="0"/>
+              </a:rPr>
+              <a:t>read_ints</a:t>
+            </a:r>
+            <a:r>
+              <a:rPr lang="en-US" dirty="0" smtClean="0">
+                <a:latin typeface="Consolas" pitchFamily="49" charset="0"/>
+              </a:rPr>
+              <a:t>)</a:t>
+            </a:r>
+            <a:br>
+              <a:rPr lang="en-US" dirty="0" smtClean="0">
+                <a:latin typeface="Consolas" pitchFamily="49" charset="0"/>
+              </a:rPr>
+            </a:br>
+            <a:r>
+              <a:rPr lang="en-US" dirty="0" smtClean="0">
+                <a:latin typeface="Consolas" pitchFamily="49" charset="0"/>
+              </a:rPr>
+              <a:t/>
+            </a:r>
+            <a:br>
+              <a:rPr lang="en-US" dirty="0" smtClean="0">
+                <a:latin typeface="Consolas" pitchFamily="49" charset="0"/>
+              </a:rPr>
+            </a:br>
+            <a:r>
+              <a:rPr lang="en-US" b="1" dirty="0" smtClean="0">
+                <a:latin typeface="Consolas" pitchFamily="49" charset="0"/>
+              </a:rPr>
+              <a:t>for </a:t>
+            </a:r>
+            <a:r>
+              <a:rPr lang="en-US" dirty="0" smtClean="0">
+                <a:latin typeface="Consolas" pitchFamily="49" charset="0"/>
+              </a:rPr>
+              <a:t>summation </a:t>
+            </a:r>
+            <a:r>
+              <a:rPr lang="en-US" b="1" dirty="0" smtClean="0">
+                <a:latin typeface="Consolas" pitchFamily="49" charset="0"/>
+              </a:rPr>
+              <a:t>in </a:t>
+            </a:r>
+            <a:r>
+              <a:rPr lang="en-US" dirty="0" err="1" smtClean="0">
+                <a:latin typeface="Consolas" pitchFamily="49" charset="0"/>
+              </a:rPr>
+              <a:t>list_of_ints</a:t>
+            </a:r>
+            <a:r>
+              <a:rPr lang="en-US" dirty="0" smtClean="0">
+                <a:latin typeface="Consolas" pitchFamily="49" charset="0"/>
+              </a:rPr>
+              <a:t>:</a:t>
+            </a:r>
+            <a:br>
+              <a:rPr lang="en-US" dirty="0" smtClean="0">
+                <a:latin typeface="Consolas" pitchFamily="49" charset="0"/>
+              </a:rPr>
+            </a:br>
+            <a:r>
+              <a:rPr lang="en-US" dirty="0" smtClean="0">
+                <a:latin typeface="Consolas" pitchFamily="49" charset="0"/>
+              </a:rPr>
+              <a:t>    sum += summation</a:t>
+            </a:r>
+            <a:br>
+              <a:rPr lang="en-US" dirty="0" smtClean="0">
+                <a:latin typeface="Consolas" pitchFamily="49" charset="0"/>
+              </a:rPr>
+            </a:br>
+            <a:r>
+              <a:rPr lang="en-US" dirty="0" smtClean="0">
+                <a:latin typeface="Consolas" pitchFamily="49" charset="0"/>
+              </a:rPr>
+              <a:t/>
+            </a:r>
+            <a:br>
+              <a:rPr lang="en-US" dirty="0" smtClean="0">
+                <a:latin typeface="Consolas" pitchFamily="49" charset="0"/>
+              </a:rPr>
+            </a:br>
+            <a:r>
+              <a:rPr lang="en-US" b="1" dirty="0" smtClean="0">
+                <a:latin typeface="Consolas" pitchFamily="49" charset="0"/>
+              </a:rPr>
+              <a:t>for </a:t>
+            </a:r>
+            <a:r>
+              <a:rPr lang="en-US" dirty="0" smtClean="0">
+                <a:latin typeface="Consolas" pitchFamily="49" charset="0"/>
+              </a:rPr>
+              <a:t>multiply </a:t>
+            </a:r>
+            <a:r>
+              <a:rPr lang="en-US" b="1" dirty="0" smtClean="0">
+                <a:latin typeface="Consolas" pitchFamily="49" charset="0"/>
+              </a:rPr>
+              <a:t>in </a:t>
+            </a:r>
+            <a:r>
+              <a:rPr lang="en-US" dirty="0" err="1" smtClean="0">
+                <a:latin typeface="Consolas" pitchFamily="49" charset="0"/>
+              </a:rPr>
+              <a:t>list_of_ints</a:t>
+            </a:r>
+            <a:r>
+              <a:rPr lang="en-US" dirty="0" smtClean="0">
+                <a:latin typeface="Consolas" pitchFamily="49" charset="0"/>
+              </a:rPr>
+              <a:t>:</a:t>
+            </a:r>
+            <a:br>
+              <a:rPr lang="en-US" dirty="0" smtClean="0">
+                <a:latin typeface="Consolas" pitchFamily="49" charset="0"/>
+              </a:rPr>
+            </a:br>
+            <a:r>
+              <a:rPr lang="en-US" dirty="0" smtClean="0">
+                <a:latin typeface="Consolas" pitchFamily="49" charset="0"/>
+              </a:rPr>
+              <a:t>    square *= multiply</a:t>
+            </a:r>
+            <a:br>
+              <a:rPr lang="en-US" dirty="0" smtClean="0">
+                <a:latin typeface="Consolas" pitchFamily="49" charset="0"/>
+              </a:rPr>
+            </a:br>
+            <a:r>
+              <a:rPr lang="en-US" dirty="0" smtClean="0">
+                <a:latin typeface="Consolas" pitchFamily="49" charset="0"/>
+              </a:rPr>
+              <a:t/>
+            </a:r>
+            <a:br>
+              <a:rPr lang="en-US" dirty="0" smtClean="0">
+                <a:latin typeface="Consolas" pitchFamily="49" charset="0"/>
+              </a:rPr>
+            </a:br>
+            <a:r>
+              <a:rPr lang="en-US" b="1" dirty="0" smtClean="0">
+                <a:latin typeface="Consolas" pitchFamily="49" charset="0"/>
+              </a:rPr>
+              <a:t>if </a:t>
+            </a:r>
+            <a:r>
+              <a:rPr lang="en-US" dirty="0" smtClean="0">
+                <a:latin typeface="Consolas" pitchFamily="49" charset="0"/>
+              </a:rPr>
+              <a:t>__name__ == </a:t>
+            </a:r>
+            <a:r>
+              <a:rPr lang="en-US" b="1" dirty="0" smtClean="0">
+                <a:latin typeface="Consolas" pitchFamily="49" charset="0"/>
+              </a:rPr>
+              <a:t>'__main__'</a:t>
+            </a:r>
+            <a:r>
+              <a:rPr lang="en-US" dirty="0" smtClean="0">
+                <a:latin typeface="Consolas" pitchFamily="49" charset="0"/>
+              </a:rPr>
+              <a:t>:</a:t>
+            </a:r>
+            <a:br>
+              <a:rPr lang="en-US" dirty="0" smtClean="0">
+                <a:latin typeface="Consolas" pitchFamily="49" charset="0"/>
+              </a:rPr>
+            </a:br>
+            <a:r>
+              <a:rPr lang="en-US" dirty="0" smtClean="0">
+                <a:latin typeface="Consolas" pitchFamily="49" charset="0"/>
+              </a:rPr>
+              <a:t>    print(</a:t>
+            </a:r>
+            <a:r>
+              <a:rPr lang="en-US" b="1" dirty="0" err="1" smtClean="0">
+                <a:latin typeface="Consolas" pitchFamily="49" charset="0"/>
+              </a:rPr>
+              <a:t>f'List</a:t>
+            </a:r>
+            <a:r>
+              <a:rPr lang="en-US" b="1" dirty="0" smtClean="0">
+                <a:latin typeface="Consolas" pitchFamily="49" charset="0"/>
+              </a:rPr>
+              <a:t> of numbers is {</a:t>
+            </a:r>
+            <a:r>
+              <a:rPr lang="en-US" dirty="0" err="1" smtClean="0">
+                <a:latin typeface="Consolas" pitchFamily="49" charset="0"/>
+              </a:rPr>
+              <a:t>list_of_ints</a:t>
+            </a:r>
+            <a:r>
+              <a:rPr lang="en-US" b="1" dirty="0" smtClean="0">
+                <a:latin typeface="Consolas" pitchFamily="49" charset="0"/>
+              </a:rPr>
+              <a:t>}'</a:t>
+            </a:r>
+            <a:r>
+              <a:rPr lang="en-US" dirty="0" smtClean="0">
+                <a:latin typeface="Consolas" pitchFamily="49" charset="0"/>
+              </a:rPr>
+              <a:t>)</a:t>
+            </a:r>
+            <a:br>
+              <a:rPr lang="en-US" dirty="0" smtClean="0">
+                <a:latin typeface="Consolas" pitchFamily="49" charset="0"/>
+              </a:rPr>
+            </a:br>
+            <a:r>
+              <a:rPr lang="en-US" dirty="0" smtClean="0">
+                <a:latin typeface="Consolas" pitchFamily="49" charset="0"/>
+              </a:rPr>
+              <a:t>    print(</a:t>
+            </a:r>
+            <a:r>
+              <a:rPr lang="en-US" b="1" dirty="0" err="1" smtClean="0">
+                <a:latin typeface="Consolas" pitchFamily="49" charset="0"/>
+              </a:rPr>
+              <a:t>f'The</a:t>
+            </a:r>
+            <a:r>
+              <a:rPr lang="en-US" b="1" dirty="0" smtClean="0">
+                <a:latin typeface="Consolas" pitchFamily="49" charset="0"/>
+              </a:rPr>
+              <a:t> sum of numbers is {</a:t>
+            </a:r>
+            <a:r>
+              <a:rPr lang="en-US" dirty="0" smtClean="0">
+                <a:latin typeface="Consolas" pitchFamily="49" charset="0"/>
+              </a:rPr>
+              <a:t>sum</a:t>
+            </a:r>
+            <a:r>
+              <a:rPr lang="en-US" b="1" dirty="0" smtClean="0">
+                <a:latin typeface="Consolas" pitchFamily="49" charset="0"/>
+              </a:rPr>
+              <a:t>}'</a:t>
+            </a:r>
+            <a:r>
+              <a:rPr lang="en-US" dirty="0" smtClean="0">
+                <a:latin typeface="Consolas" pitchFamily="49" charset="0"/>
+              </a:rPr>
+              <a:t>)</a:t>
+            </a:r>
+            <a:br>
+              <a:rPr lang="en-US" dirty="0" smtClean="0">
+                <a:latin typeface="Consolas" pitchFamily="49" charset="0"/>
+              </a:rPr>
+            </a:br>
+            <a:r>
+              <a:rPr lang="en-US" dirty="0" smtClean="0">
+                <a:latin typeface="Consolas" pitchFamily="49" charset="0"/>
+              </a:rPr>
+              <a:t>    print(</a:t>
+            </a:r>
+            <a:r>
+              <a:rPr lang="en-US" b="1" dirty="0" err="1" smtClean="0">
+                <a:latin typeface="Consolas" pitchFamily="49" charset="0"/>
+              </a:rPr>
+              <a:t>f'The</a:t>
+            </a:r>
+            <a:r>
+              <a:rPr lang="en-US" b="1" dirty="0" smtClean="0">
+                <a:latin typeface="Consolas" pitchFamily="49" charset="0"/>
+              </a:rPr>
+              <a:t> multiplication of numbers is {</a:t>
+            </a:r>
+            <a:r>
+              <a:rPr lang="en-US" dirty="0" smtClean="0">
+                <a:latin typeface="Consolas" pitchFamily="49" charset="0"/>
+              </a:rPr>
+              <a:t>square</a:t>
+            </a:r>
+            <a:r>
+              <a:rPr lang="en-US" b="1" dirty="0" smtClean="0">
+                <a:latin typeface="Consolas" pitchFamily="49" charset="0"/>
+              </a:rPr>
+              <a:t>}'</a:t>
+            </a:r>
+            <a:r>
+              <a:rPr lang="en-US" dirty="0" smtClean="0">
+                <a:latin typeface="Consolas" pitchFamily="49" charset="0"/>
+              </a:rPr>
+              <a:t>)</a:t>
+            </a:r>
+            <a:endParaRPr lang="en-US" dirty="0">
+              <a:latin typeface="Consolas" pitchFamily="49" charset="0"/>
+            </a:endParaRPr>
           </a:p>
         </p:txBody>
       </p:sp>
@@ -3909,10 +4365,16 @@
         </p:nvSpPr>
         <p:spPr/>
         <p:txBody>
-          <a:bodyPr/>
-          <a:lstStyle/>
-          <a:p>
-            <a:endParaRPr lang="en-US"/>
+          <a:bodyPr>
+            <a:normAutofit fontScale="90000"/>
+          </a:bodyPr>
+          <a:lstStyle/>
+          <a:p>
+            <a:r>
+              <a:rPr lang="en-US" dirty="0" smtClean="0"/>
+              <a:t>Write a Function for Computing Area of an Ellipse </a:t>
+            </a:r>
+            <a:endParaRPr lang="en-US" dirty="0"/>
           </a:p>
         </p:txBody>
       </p:sp>
@@ -3928,10 +4390,27 @@
         </p:nvSpPr>
         <p:spPr/>
         <p:txBody>
-          <a:bodyPr/>
-          <a:lstStyle/>
-          <a:p>
-            <a:endParaRPr lang="en-US"/>
+          <a:bodyPr>
+            <a:normAutofit/>
+          </a:bodyPr>
+          <a:lstStyle/>
+          <a:p>
+            <a:pPr algn="ctr">
+              <a:buNone/>
+            </a:pPr>
+            <a:r>
+              <a:rPr lang="en-US" sz="10000" i="1" dirty="0" smtClean="0"/>
+              <a:t>A=</a:t>
+            </a:r>
+            <a:r>
+              <a:rPr lang="el-GR" sz="10000" i="1" dirty="0" smtClean="0"/>
+              <a:t>π</a:t>
+            </a:r>
+            <a:r>
+              <a:rPr lang="en-US" sz="10000" i="1" dirty="0" err="1" smtClean="0"/>
+              <a:t>ab</a:t>
+            </a:r>
+            <a:endParaRPr lang="en-US" sz="10000" dirty="0"/>
           </a:p>
         </p:txBody>
       </p:sp>
@@ -3975,7 +4454,11 @@
           <a:bodyPr/>
           <a:lstStyle/>
           <a:p>
-            <a:endParaRPr lang="en-US"/>
+            <a:r>
+              <a:rPr lang="en-US" dirty="0" smtClean="0"/>
+              <a:t>Solution</a:t>
+            </a:r>
+            <a:endParaRPr lang="en-US" dirty="0"/>
           </a:p>
         </p:txBody>
       </p:sp>
@@ -3991,10 +4474,107 @@
         </p:nvSpPr>
         <p:spPr/>
         <p:txBody>
-          <a:bodyPr/>
-          <a:lstStyle/>
-          <a:p>
-            <a:endParaRPr lang="en-US"/>
+          <a:bodyPr>
+            <a:normAutofit/>
+          </a:bodyPr>
+          <a:lstStyle/>
+          <a:p>
+            <a:pPr>
+              <a:buNone/>
+            </a:pPr>
+            <a:r>
+              <a:rPr lang="en-US" sz="2400" dirty="0" smtClean="0">
+                <a:latin typeface="Consolas" pitchFamily="49" charset="0"/>
+              </a:rPr>
+              <a:t>from math import pi</a:t>
+            </a:r>
+          </a:p>
+          <a:p>
+            <a:pPr>
+              <a:buNone/>
+            </a:pPr>
+            <a:endParaRPr lang="en-US" sz="2400" dirty="0" smtClean="0">
+              <a:latin typeface="Consolas" pitchFamily="49" charset="0"/>
+            </a:endParaRPr>
+          </a:p>
+          <a:p>
+            <a:pPr>
+              <a:buNone/>
+            </a:pPr>
+            <a:r>
+              <a:rPr lang="en-US" sz="2400" dirty="0" smtClean="0">
+                <a:latin typeface="Consolas" pitchFamily="49" charset="0"/>
+              </a:rPr>
+              <a:t>def </a:t>
+            </a:r>
+            <a:r>
+              <a:rPr lang="en-US" sz="2400" dirty="0" err="1" smtClean="0">
+                <a:latin typeface="Consolas" pitchFamily="49" charset="0"/>
+              </a:rPr>
+              <a:t>area_of_ellipse</a:t>
+            </a:r>
+            <a:r>
+              <a:rPr lang="en-US" sz="2400" dirty="0" smtClean="0">
+                <a:latin typeface="Consolas" pitchFamily="49" charset="0"/>
+              </a:rPr>
+              <a:t>(a, b):</a:t>
+            </a:r>
+          </a:p>
+          <a:p>
+            <a:pPr>
+              <a:buNone/>
+            </a:pPr>
+            <a:r>
+              <a:rPr lang="en-US" sz="2400" dirty="0" smtClean="0">
+                <a:latin typeface="Consolas" pitchFamily="49" charset="0"/>
+              </a:rPr>
+              <a:t>    return pi * a * b</a:t>
+            </a:r>
+          </a:p>
+          <a:p>
+            <a:pPr>
+              <a:buNone/>
+            </a:pPr>
+            <a:endParaRPr lang="en-US" sz="2400" dirty="0" smtClean="0">
+              <a:latin typeface="Consolas" pitchFamily="49" charset="0"/>
+            </a:endParaRPr>
+          </a:p>
+          <a:p>
+            <a:pPr>
+              <a:buNone/>
+            </a:pPr>
+            <a:r>
+              <a:rPr lang="en-US" sz="2400" dirty="0" smtClean="0">
+                <a:latin typeface="Consolas" pitchFamily="49" charset="0"/>
+              </a:rPr>
+              <a:t>if __name__ == '__main__':</a:t>
+            </a:r>
+          </a:p>
+          <a:p>
+            <a:pPr>
+              <a:buNone/>
+            </a:pPr>
+            <a:r>
+              <a:rPr lang="en-US" sz="2400" dirty="0" smtClean="0">
+                <a:latin typeface="Consolas" pitchFamily="49" charset="0"/>
+              </a:rPr>
+              <a:t>    print(round(</a:t>
+            </a:r>
+            <a:r>
+              <a:rPr lang="en-US" sz="2400" dirty="0" err="1" smtClean="0">
+                <a:latin typeface="Consolas" pitchFamily="49" charset="0"/>
+              </a:rPr>
+              <a:t>area_of_ellipse</a:t>
+            </a:r>
+            <a:r>
+              <a:rPr lang="en-US" sz="2400" dirty="0" smtClean="0">
+                <a:latin typeface="Consolas" pitchFamily="49" charset="0"/>
+              </a:rPr>
+              <a:t>(5, 10), 2))</a:t>
+            </a:r>
+            <a:endParaRPr lang="en-US" sz="2400" dirty="0">
+              <a:latin typeface="Consolas" pitchFamily="49" charset="0"/>
+            </a:endParaRPr>
           </a:p>
         </p:txBody>
       </p:sp>
@@ -4035,10 +4615,24 @@
         </p:nvSpPr>
         <p:spPr/>
         <p:txBody>
-          <a:bodyPr/>
-          <a:lstStyle/>
-          <a:p>
-            <a:endParaRPr lang="en-US"/>
+          <a:bodyPr>
+            <a:normAutofit fontScale="90000"/>
+          </a:bodyPr>
+          <a:lstStyle/>
+          <a:p>
+            <a:r>
+              <a:rPr lang="en-US" dirty="0" smtClean="0"/>
+              <a:t>We Can Soup This Up With the </a:t>
+            </a:r>
+            <a:r>
+              <a:rPr lang="en-US" dirty="0" err="1" smtClean="0"/>
+              <a:t>argparse</a:t>
+            </a:r>
+            <a:r>
+              <a:rPr lang="en-US" dirty="0" smtClean="0"/>
+              <a:t> module</a:t>
+            </a:r>
+            <a:endParaRPr lang="en-US" dirty="0"/>
           </a:p>
         </p:txBody>
       </p:sp>
@@ -4054,10 +4648,55 @@
         </p:nvSpPr>
         <p:spPr/>
         <p:txBody>
-          <a:bodyPr/>
-          <a:lstStyle/>
-          <a:p>
-            <a:endParaRPr lang="en-US"/>
+          <a:bodyPr>
+            <a:normAutofit fontScale="92500" lnSpcReduction="10000"/>
+          </a:bodyPr>
+          <a:lstStyle/>
+          <a:p>
+            <a:r>
+              <a:rPr lang="en-US" dirty="0" smtClean="0"/>
+              <a:t>A parser for command-line options, arguments, and sub-commands</a:t>
+            </a:r>
+          </a:p>
+          <a:p>
+            <a:r>
+              <a:rPr lang="en-US" dirty="0" smtClean="0"/>
+              <a:t>Makes it easy to write user friendly command line interfaces</a:t>
+            </a:r>
+          </a:p>
+          <a:p>
+            <a:r>
+              <a:rPr lang="en-US" dirty="0" smtClean="0"/>
+              <a:t>Allows for the addition of help messages </a:t>
+            </a:r>
+          </a:p>
+          <a:p>
+            <a:r>
+              <a:rPr lang="en-US" dirty="0" smtClean="0"/>
+              <a:t>Allows for the addition of flags </a:t>
+            </a:r>
+          </a:p>
+          <a:p>
+            <a:r>
+              <a:rPr lang="en-US" dirty="0" smtClean="0"/>
+              <a:t>Is used HEAVILY in the industry</a:t>
+            </a:r>
+          </a:p>
+          <a:p>
+            <a:r>
+              <a:rPr lang="en-US" dirty="0" smtClean="0"/>
+              <a:t>Documentation: </a:t>
+            </a:r>
+            <a:r>
+              <a:rPr lang="en-US" sz="2500" dirty="0" smtClean="0">
+                <a:latin typeface="Consolas" pitchFamily="49" charset="0"/>
+                <a:hlinkClick r:id="rId2"/>
+              </a:rPr>
+              <a:t>https://docs.python.org/3/library/argparse.html</a:t>
+            </a:r>
+            <a:endParaRPr lang="en-US" sz="2500" dirty="0" smtClean="0">
+              <a:latin typeface="Consolas" pitchFamily="49" charset="0"/>
+            </a:endParaRPr>
           </a:p>
         </p:txBody>
       </p:sp>
@@ -4126,7 +4765,17 @@
           <a:p>
             <a:r>
               <a:rPr lang="en-US" dirty="0" smtClean="0"/>
-              <a:t>Going to look at how to pass in arguments via the command line using the sys module</a:t>
+              <a:t>Going to look at how to pass in arguments via the command line using the </a:t>
+            </a:r>
+            <a:r>
+              <a:rPr lang="en-US" dirty="0" smtClean="0">
+                <a:latin typeface="Consolas" pitchFamily="49" charset="0"/>
+              </a:rPr>
+              <a:t>sys</a:t>
+            </a:r>
+            <a:r>
+              <a:rPr lang="en-US" dirty="0" smtClean="0"/>
+              <a:t> module</a:t>
             </a:r>
           </a:p>
           <a:p>
@@ -4189,12 +4838,33 @@
             <p:ph type="title"/>
           </p:nvPr>
         </p:nvSpPr>
-        <p:spPr/>
-        <p:txBody>
-          <a:bodyPr/>
-          <a:lstStyle/>
-          <a:p>
-            <a:endParaRPr lang="en-US"/>
+        <p:spPr>
+          <a:xfrm>
+            <a:off x="381000" y="152400"/>
+            <a:ext cx="8229600" cy="1249362"/>
+          </a:xfrm>
+        </p:spPr>
+        <p:txBody>
+          <a:bodyPr>
+            <a:normAutofit fontScale="90000"/>
+          </a:bodyPr>
+          <a:lstStyle/>
+          <a:p>
+            <a:r>
+              <a:rPr lang="en-US" dirty="0" smtClean="0"/>
+              <a:t>Previous Script enhanced with </a:t>
+            </a:r>
+            <a:r>
+              <a:rPr lang="en-US" dirty="0" err="1" smtClean="0">
+                <a:latin typeface="Consolas" pitchFamily="49" charset="0"/>
+              </a:rPr>
+              <a:t>argparse</a:t>
+            </a:r>
+            <a:r>
+              <a:rPr lang="en-US" dirty="0" smtClean="0"/>
+              <a:t> </a:t>
+            </a:r>
+            <a:endParaRPr lang="en-US" dirty="0"/>
           </a:p>
         </p:txBody>
       </p:sp>
@@ -4208,12 +4878,349 @@
             <p:ph idx="1"/>
           </p:nvPr>
         </p:nvSpPr>
-        <p:spPr/>
-        <p:txBody>
-          <a:bodyPr/>
-          <a:lstStyle/>
-          <a:p>
-            <a:endParaRPr lang="en-US"/>
+        <p:spPr>
+          <a:xfrm>
+            <a:off x="457200" y="1371600"/>
+            <a:ext cx="8229600" cy="5257800"/>
+          </a:xfrm>
+        </p:spPr>
+        <p:txBody>
+          <a:bodyPr>
+            <a:noAutofit/>
+          </a:bodyPr>
+          <a:lstStyle/>
+          <a:p>
+            <a:pPr>
+              <a:buNone/>
+            </a:pPr>
+            <a:r>
+              <a:rPr lang="en-US" sz="1600" dirty="0" smtClean="0">
+                <a:latin typeface="Consolas" pitchFamily="49" charset="0"/>
+              </a:rPr>
+              <a:t>import </a:t>
+            </a:r>
+            <a:r>
+              <a:rPr lang="en-US" sz="1600" dirty="0" err="1" smtClean="0">
+                <a:latin typeface="Consolas" pitchFamily="49" charset="0"/>
+              </a:rPr>
+              <a:t>argparse</a:t>
+            </a:r>
+            <a:endParaRPr lang="en-US" sz="1600" dirty="0" smtClean="0">
+              <a:latin typeface="Consolas" pitchFamily="49" charset="0"/>
+            </a:endParaRPr>
+          </a:p>
+          <a:p>
+            <a:pPr>
+              <a:buNone/>
+            </a:pPr>
+            <a:r>
+              <a:rPr lang="en-US" sz="1600" dirty="0" smtClean="0">
+                <a:latin typeface="Consolas" pitchFamily="49" charset="0"/>
+              </a:rPr>
+              <a:t>from math import pi</a:t>
+            </a:r>
+          </a:p>
+          <a:p>
+            <a:pPr>
+              <a:buNone/>
+            </a:pPr>
+            <a:endParaRPr lang="en-US" sz="1600" dirty="0" smtClean="0">
+              <a:latin typeface="Consolas" pitchFamily="49" charset="0"/>
+            </a:endParaRPr>
+          </a:p>
+          <a:p>
+            <a:pPr>
+              <a:buNone/>
+            </a:pPr>
+            <a:r>
+              <a:rPr lang="en-US" sz="1600" dirty="0" smtClean="0">
+                <a:latin typeface="Consolas" pitchFamily="49" charset="0"/>
+              </a:rPr>
+              <a:t>parser = </a:t>
+            </a:r>
+            <a:r>
+              <a:rPr lang="en-US" sz="1600" dirty="0" err="1" smtClean="0">
+                <a:latin typeface="Consolas" pitchFamily="49" charset="0"/>
+              </a:rPr>
+              <a:t>argparse.ArgumentParser</a:t>
+            </a:r>
+            <a:r>
+              <a:rPr lang="en-US" sz="1600" dirty="0" smtClean="0">
+                <a:latin typeface="Consolas" pitchFamily="49" charset="0"/>
+              </a:rPr>
+              <a:t>(description='Compute area of an ellipse')</a:t>
+            </a:r>
+          </a:p>
+          <a:p>
+            <a:pPr>
+              <a:buNone/>
+            </a:pPr>
+            <a:r>
+              <a:rPr lang="en-US" sz="1600" dirty="0" err="1" smtClean="0">
+                <a:latin typeface="Consolas" pitchFamily="49" charset="0"/>
+              </a:rPr>
+              <a:t>parser.add_argument</a:t>
+            </a:r>
+            <a:r>
+              <a:rPr lang="en-US" sz="1600" dirty="0" smtClean="0">
+                <a:latin typeface="Consolas" pitchFamily="49" charset="0"/>
+              </a:rPr>
+              <a:t>('-a', '--Axis', type=</a:t>
+            </a:r>
+            <a:r>
+              <a:rPr lang="en-US" sz="1600" dirty="0" err="1" smtClean="0">
+                <a:latin typeface="Consolas" pitchFamily="49" charset="0"/>
+              </a:rPr>
+              <a:t>int</a:t>
+            </a:r>
+            <a:r>
+              <a:rPr lang="en-US" sz="1600" dirty="0" smtClean="0">
+                <a:latin typeface="Consolas" pitchFamily="49" charset="0"/>
+              </a:rPr>
+              <a:t>, help='a axis of an ellipse')</a:t>
+            </a:r>
+          </a:p>
+          <a:p>
+            <a:pPr>
+              <a:buNone/>
+            </a:pPr>
+            <a:r>
+              <a:rPr lang="en-US" sz="1600" dirty="0" err="1" smtClean="0">
+                <a:latin typeface="Consolas" pitchFamily="49" charset="0"/>
+              </a:rPr>
+              <a:t>parser.add_argument</a:t>
+            </a:r>
+            <a:r>
+              <a:rPr lang="en-US" sz="1600" dirty="0" smtClean="0">
+                <a:latin typeface="Consolas" pitchFamily="49" charset="0"/>
+              </a:rPr>
+              <a:t>('-b', '--</a:t>
+            </a:r>
+            <a:r>
+              <a:rPr lang="en-US" sz="1600" dirty="0" err="1" smtClean="0">
+                <a:latin typeface="Consolas" pitchFamily="49" charset="0"/>
+              </a:rPr>
+              <a:t>Bxis</a:t>
+            </a:r>
+            <a:r>
+              <a:rPr lang="en-US" sz="1600" dirty="0" smtClean="0">
+                <a:latin typeface="Consolas" pitchFamily="49" charset="0"/>
+              </a:rPr>
+              <a:t>', type=</a:t>
+            </a:r>
+            <a:r>
+              <a:rPr lang="en-US" sz="1600" dirty="0" err="1" smtClean="0">
+                <a:latin typeface="Consolas" pitchFamily="49" charset="0"/>
+              </a:rPr>
+              <a:t>int</a:t>
+            </a:r>
+            <a:r>
+              <a:rPr lang="en-US" sz="1600" dirty="0" smtClean="0">
+                <a:latin typeface="Consolas" pitchFamily="49" charset="0"/>
+              </a:rPr>
+              <a:t>, help='b axis of an ellipse')</a:t>
+            </a:r>
+          </a:p>
+          <a:p>
+            <a:pPr>
+              <a:buNone/>
+            </a:pPr>
+            <a:r>
+              <a:rPr lang="en-US" sz="1600" dirty="0" err="1" smtClean="0">
+                <a:latin typeface="Consolas" pitchFamily="49" charset="0"/>
+              </a:rPr>
+              <a:t>args</a:t>
+            </a:r>
+            <a:r>
+              <a:rPr lang="en-US" sz="1600" dirty="0" smtClean="0">
+                <a:latin typeface="Consolas" pitchFamily="49" charset="0"/>
+              </a:rPr>
+              <a:t> = </a:t>
+            </a:r>
+            <a:r>
+              <a:rPr lang="en-US" sz="1600" dirty="0" err="1" smtClean="0">
+                <a:latin typeface="Consolas" pitchFamily="49" charset="0"/>
+              </a:rPr>
+              <a:t>parser.parse_args</a:t>
+            </a:r>
+            <a:r>
+              <a:rPr lang="en-US" sz="1600" dirty="0" smtClean="0">
+                <a:latin typeface="Consolas" pitchFamily="49" charset="0"/>
+              </a:rPr>
+              <a:t>()</a:t>
+            </a:r>
+          </a:p>
+          <a:p>
+            <a:pPr>
+              <a:buNone/>
+            </a:pPr>
+            <a:endParaRPr lang="en-US" sz="1600" dirty="0" smtClean="0">
+              <a:latin typeface="Consolas" pitchFamily="49" charset="0"/>
+            </a:endParaRPr>
+          </a:p>
+          <a:p>
+            <a:pPr>
+              <a:buNone/>
+            </a:pPr>
+            <a:endParaRPr lang="en-US" sz="1600" dirty="0" smtClean="0">
+              <a:latin typeface="Consolas" pitchFamily="49" charset="0"/>
+            </a:endParaRPr>
+          </a:p>
+          <a:p>
+            <a:pPr>
+              <a:buNone/>
+            </a:pPr>
+            <a:r>
+              <a:rPr lang="en-US" sz="1600" dirty="0" smtClean="0">
+                <a:latin typeface="Consolas" pitchFamily="49" charset="0"/>
+              </a:rPr>
+              <a:t>def </a:t>
+            </a:r>
+            <a:r>
+              <a:rPr lang="en-US" sz="1600" dirty="0" err="1" smtClean="0">
+                <a:latin typeface="Consolas" pitchFamily="49" charset="0"/>
+              </a:rPr>
+              <a:t>area_of_ellipse</a:t>
+            </a:r>
+            <a:r>
+              <a:rPr lang="en-US" sz="1600" dirty="0" smtClean="0">
+                <a:latin typeface="Consolas" pitchFamily="49" charset="0"/>
+              </a:rPr>
+              <a:t>(</a:t>
+            </a:r>
+            <a:r>
+              <a:rPr lang="en-US" sz="1600" dirty="0" err="1" smtClean="0">
+                <a:latin typeface="Consolas" pitchFamily="49" charset="0"/>
+              </a:rPr>
+              <a:t>a_xis</a:t>
+            </a:r>
+            <a:r>
+              <a:rPr lang="en-US" sz="1600" dirty="0" smtClean="0">
+                <a:latin typeface="Consolas" pitchFamily="49" charset="0"/>
+              </a:rPr>
+              <a:t>, </a:t>
+            </a:r>
+            <a:r>
+              <a:rPr lang="en-US" sz="1600" dirty="0" err="1" smtClean="0">
+                <a:latin typeface="Consolas" pitchFamily="49" charset="0"/>
+              </a:rPr>
+              <a:t>b_xis</a:t>
+            </a:r>
+            <a:r>
+              <a:rPr lang="en-US" sz="1600" dirty="0" smtClean="0">
+                <a:latin typeface="Consolas" pitchFamily="49" charset="0"/>
+              </a:rPr>
+              <a:t>):</a:t>
+            </a:r>
+          </a:p>
+          <a:p>
+            <a:pPr>
+              <a:buNone/>
+            </a:pPr>
+            <a:r>
+              <a:rPr lang="en-US" sz="1600" dirty="0" smtClean="0">
+                <a:latin typeface="Consolas" pitchFamily="49" charset="0"/>
+              </a:rPr>
+              <a:t>    return pi * </a:t>
+            </a:r>
+            <a:r>
+              <a:rPr lang="en-US" sz="1600" dirty="0" err="1" smtClean="0">
+                <a:latin typeface="Consolas" pitchFamily="49" charset="0"/>
+              </a:rPr>
+              <a:t>a_xis</a:t>
+            </a:r>
+            <a:r>
+              <a:rPr lang="en-US" sz="1600" dirty="0" smtClean="0">
+                <a:latin typeface="Consolas" pitchFamily="49" charset="0"/>
+              </a:rPr>
+              <a:t> * </a:t>
+            </a:r>
+            <a:r>
+              <a:rPr lang="en-US" sz="1600" dirty="0" err="1" smtClean="0">
+                <a:latin typeface="Consolas" pitchFamily="49" charset="0"/>
+              </a:rPr>
+              <a:t>b_xis</a:t>
+            </a:r>
+            <a:endParaRPr lang="en-US" sz="1600" dirty="0" smtClean="0">
+              <a:latin typeface="Consolas" pitchFamily="49" charset="0"/>
+            </a:endParaRPr>
+          </a:p>
+          <a:p>
+            <a:pPr>
+              <a:buNone/>
+            </a:pPr>
+            <a:endParaRPr lang="en-US" sz="1600" dirty="0" smtClean="0">
+              <a:latin typeface="Consolas" pitchFamily="49" charset="0"/>
+            </a:endParaRPr>
+          </a:p>
+          <a:p>
+            <a:pPr>
+              <a:buNone/>
+            </a:pPr>
+            <a:endParaRPr lang="en-US" sz="1600" dirty="0" smtClean="0">
+              <a:latin typeface="Consolas" pitchFamily="49" charset="0"/>
+            </a:endParaRPr>
+          </a:p>
+          <a:p>
+            <a:pPr>
+              <a:buNone/>
+            </a:pPr>
+            <a:r>
+              <a:rPr lang="en-US" sz="1600" dirty="0" smtClean="0">
+                <a:latin typeface="Consolas" pitchFamily="49" charset="0"/>
+              </a:rPr>
+              <a:t>if __name__ == '__main__':</a:t>
+            </a:r>
+          </a:p>
+          <a:p>
+            <a:pPr>
+              <a:buNone/>
+            </a:pPr>
+            <a:r>
+              <a:rPr lang="en-US" sz="1600" dirty="0" smtClean="0">
+                <a:latin typeface="Consolas" pitchFamily="49" charset="0"/>
+              </a:rPr>
+              <a:t>    print(round(</a:t>
+            </a:r>
+            <a:r>
+              <a:rPr lang="en-US" sz="1600" dirty="0" err="1" smtClean="0">
+                <a:latin typeface="Consolas" pitchFamily="49" charset="0"/>
+              </a:rPr>
+              <a:t>area_of_ellipse</a:t>
+            </a:r>
+            <a:r>
+              <a:rPr lang="en-US" sz="1600" dirty="0" smtClean="0">
+                <a:latin typeface="Consolas" pitchFamily="49" charset="0"/>
+              </a:rPr>
+              <a:t>(</a:t>
+            </a:r>
+            <a:r>
+              <a:rPr lang="en-US" sz="1600" dirty="0" err="1" smtClean="0">
+                <a:latin typeface="Consolas" pitchFamily="49" charset="0"/>
+              </a:rPr>
+              <a:t>args.Axis</a:t>
+            </a:r>
+            <a:r>
+              <a:rPr lang="en-US" sz="1600" dirty="0" smtClean="0">
+                <a:latin typeface="Consolas" pitchFamily="49" charset="0"/>
+              </a:rPr>
+              <a:t>, </a:t>
+            </a:r>
+            <a:r>
+              <a:rPr lang="en-US" sz="1600" dirty="0" err="1" smtClean="0">
+                <a:latin typeface="Consolas" pitchFamily="49" charset="0"/>
+              </a:rPr>
+              <a:t>args.Bxis</a:t>
+            </a:r>
+            <a:r>
+              <a:rPr lang="en-US" sz="1600" dirty="0" smtClean="0">
+                <a:latin typeface="Consolas" pitchFamily="49" charset="0"/>
+              </a:rPr>
+              <a:t>), 2))</a:t>
+            </a:r>
+            <a:endParaRPr lang="en-US" sz="1600" dirty="0">
+              <a:latin typeface="Consolas" pitchFamily="49" charset="0"/>
+            </a:endParaRPr>
           </a:p>
         </p:txBody>
       </p:sp>
@@ -4257,7 +5264,11 @@
           <a:bodyPr/>
           <a:lstStyle/>
           <a:p>
-            <a:endParaRPr lang="en-US"/>
+            <a:r>
+              <a:rPr lang="en-US" dirty="0" smtClean="0"/>
+              <a:t>Lesson Source code</a:t>
+            </a:r>
+            <a:endParaRPr lang="en-US" dirty="0"/>
           </a:p>
         </p:txBody>
       </p:sp>
@@ -4276,70 +5287,23 @@
           <a:bodyPr/>
           <a:lstStyle/>
           <a:p>
-            <a:endParaRPr lang="en-US"/>
-          </a:p>
-        </p:txBody>
-      </p:sp>
-    </p:spTree>
-  </p:cSld>
-  <p:clrMapOvr>
-    <a:masterClrMapping/>
-  </p:clrMapOvr>
-</p:sld>
-</file>
-
-<file path=ppt/slides/slide22.xml><?xml version="1.0" encoding="utf-8"?>
-<p:sld xmlns:a="http://schemas.openxmlformats.org/drawingml/2006/main" xmlns:r="http://schemas.openxmlformats.org/officeDocument/2006/relationships" xmlns:p="http://schemas.openxmlformats.org/presentationml/2006/main">
-  <p:cSld>
-    <p:spTree>
-      <p:nvGrpSpPr>
-        <p:cNvPr id="1" name=""/>
-        <p:cNvGrpSpPr/>
-        <p:nvPr/>
-      </p:nvGrpSpPr>
-      <p:grpSpPr>
-        <a:xfrm>
-          <a:off x="0" y="0"/>
-          <a:ext cx="0" cy="0"/>
-          <a:chOff x="0" y="0"/>
-          <a:chExt cx="0" cy="0"/>
-        </a:xfrm>
-      </p:grpSpPr>
-      <p:sp>
-        <p:nvSpPr>
-          <p:cNvPr id="2" name="Title 1"/>
-          <p:cNvSpPr>
-            <a:spLocks noGrp="1"/>
-          </p:cNvSpPr>
-          <p:nvPr>
-            <p:ph type="title"/>
-          </p:nvPr>
-        </p:nvSpPr>
-        <p:spPr/>
-        <p:txBody>
-          <a:bodyPr/>
-          <a:lstStyle/>
-          <a:p>
-            <a:endParaRPr lang="en-US"/>
-          </a:p>
-        </p:txBody>
-      </p:sp>
-      <p:sp>
-        <p:nvSpPr>
-          <p:cNvPr id="3" name="Content Placeholder 2"/>
-          <p:cNvSpPr>
-            <a:spLocks noGrp="1"/>
-          </p:cNvSpPr>
-          <p:nvPr>
-            <p:ph idx="1"/>
-          </p:nvPr>
-        </p:nvSpPr>
-        <p:spPr/>
-        <p:txBody>
-          <a:bodyPr/>
-          <a:lstStyle/>
-          <a:p>
-            <a:endParaRPr lang="en-US"/>
+            <a:r>
+              <a:rPr lang="en-US" dirty="0" smtClean="0"/>
+              <a:t>Access the source code here </a:t>
+            </a:r>
+            <a:r>
+              <a:rPr lang="en-US" dirty="0" smtClean="0">
+                <a:solidFill>
+                  <a:srgbClr val="FF0000"/>
+                </a:solidFill>
+              </a:rPr>
+              <a:t>[INSERT LINK]: </a:t>
+            </a:r>
+            <a:endParaRPr lang="en-US" dirty="0">
+              <a:solidFill>
+                <a:srgbClr val="FF0000"/>
+              </a:solidFill>
+            </a:endParaRPr>
           </a:p>
         </p:txBody>
       </p:sp>
@@ -4738,8 +5702,19 @@
           <a:p>
             <a:r>
               <a:rPr lang="en-US" dirty="0" smtClean="0"/>
-              <a:t>For example, if they want to get the area of a triangle without modifying area.py</a:t>
-            </a:r>
+              <a:t>For example, if they want to get the area of a triangle without modifying </a:t>
+            </a:r>
+            <a:r>
+              <a:rPr lang="en-US" dirty="0" smtClean="0"/>
+              <a:t>area.py</a:t>
+            </a:r>
+          </a:p>
+          <a:p>
+            <a:r>
+              <a:rPr lang="en-US" dirty="0" smtClean="0"/>
+              <a:t>Modifying code in this context could be dangerous</a:t>
+            </a:r>
+            <a:endParaRPr lang="en-US" dirty="0" smtClean="0"/>
           </a:p>
           <a:p>
             <a:pPr>

</xml_diff>